<commit_message>
updated slides with names, dates, minor content
</commit_message>
<xml_diff>
--- a/materials/TutorialPle_part2.pptx
+++ b/materials/TutorialPle_part2.pptx
@@ -220,7 +220,7 @@
           <a:p>
             <a:fld id="{0CB52742-373F-4A87-92C3-F1BD6DE2FDEE}" type="datetimeFigureOut">
               <a:rPr lang="en-US" smtClean="0"/>
-              <a:t>3/28/2019</a:t>
+              <a:t>9/18/2019</a:t>
             </a:fld>
             <a:endParaRPr lang="en-US"/>
           </a:p>
@@ -2223,31 +2223,221 @@
             <p:ph type="subTitle" idx="1"/>
           </p:nvPr>
         </p:nvSpPr>
-        <p:spPr/>
+        <p:spPr>
+          <a:xfrm>
+            <a:off x="3149600" y="5029200"/>
+            <a:ext cx="8128000" cy="1066800"/>
+          </a:xfrm>
+        </p:spPr>
         <p:txBody>
-          <a:bodyPr/>
+          <a:bodyPr>
+            <a:normAutofit/>
+          </a:bodyPr>
           <a:lstStyle/>
           <a:p>
             <a:r>
               <a:rPr lang="en-US" dirty="0"/>
-              <a:t>Marc </a:t>
-            </a:r>
-            <a:r>
-              <a:rPr lang="en-US" dirty="0" err="1"/>
-              <a:t>Suchard</a:t>
-            </a:r>
-            <a:endParaRPr lang="en-US" dirty="0"/>
-          </a:p>
-          <a:p>
-            <a:r>
-              <a:rPr lang="en-US" dirty="0"/>
               <a:t>Martijn Schuemie</a:t>
             </a:r>
           </a:p>
           <a:p>
             <a:r>
               <a:rPr lang="en-US" dirty="0"/>
-              <a:t>Patrick Ryan</a:t>
+              <a:t>Janssen R&amp;D, UCLA</a:t>
+            </a:r>
+          </a:p>
+        </p:txBody>
+      </p:sp>
+      <p:sp>
+        <p:nvSpPr>
+          <p:cNvPr id="4" name="Subtitle 2">
+            <a:extLst>
+              <a:ext uri="{FF2B5EF4-FFF2-40B4-BE49-F238E27FC236}">
+                <a16:creationId xmlns:a16="http://schemas.microsoft.com/office/drawing/2014/main" id="{D114BC16-95E1-4B73-A483-8F65D72AE7BF}"/>
+              </a:ext>
+            </a:extLst>
+          </p:cNvPr>
+          <p:cNvSpPr txBox="1">
+            <a:spLocks/>
+          </p:cNvSpPr>
+          <p:nvPr/>
+        </p:nvSpPr>
+        <p:spPr>
+          <a:xfrm>
+            <a:off x="4699000" y="3886201"/>
+            <a:ext cx="5029200" cy="914400"/>
+          </a:xfrm>
+          <a:prstGeom prst="rect">
+            <a:avLst/>
+          </a:prstGeom>
+        </p:spPr>
+        <p:txBody>
+          <a:bodyPr vert="horz" lIns="91440" tIns="45720" rIns="91440" bIns="45720" rtlCol="0">
+            <a:normAutofit/>
+          </a:bodyPr>
+          <a:lstStyle>
+            <a:lvl1pPr marL="0" indent="0" algn="ctr" defTabSz="914400" rtl="0" eaLnBrk="1" latinLnBrk="0" hangingPunct="1">
+              <a:spcBef>
+                <a:spcPct val="20000"/>
+              </a:spcBef>
+              <a:buFont typeface="Arial" panose="020B0604020202020204" pitchFamily="34" charset="0"/>
+              <a:buNone/>
+              <a:defRPr sz="2800" kern="1200">
+                <a:solidFill>
+                  <a:srgbClr val="153153"/>
+                </a:solidFill>
+                <a:latin typeface="+mn-lt"/>
+                <a:ea typeface="+mn-ea"/>
+                <a:cs typeface="+mn-cs"/>
+              </a:defRPr>
+            </a:lvl1pPr>
+            <a:lvl2pPr marL="457200" indent="0" algn="ctr" defTabSz="914400" rtl="0" eaLnBrk="1" latinLnBrk="0" hangingPunct="1">
+              <a:spcBef>
+                <a:spcPct val="20000"/>
+              </a:spcBef>
+              <a:buFont typeface="Arial" panose="020B0604020202020204" pitchFamily="34" charset="0"/>
+              <a:buNone/>
+              <a:defRPr sz="2800" kern="1200">
+                <a:solidFill>
+                  <a:schemeClr val="tx1">
+                    <a:tint val="75000"/>
+                  </a:schemeClr>
+                </a:solidFill>
+                <a:latin typeface="+mn-lt"/>
+                <a:ea typeface="+mn-ea"/>
+                <a:cs typeface="+mn-cs"/>
+              </a:defRPr>
+            </a:lvl2pPr>
+            <a:lvl3pPr marL="914400" indent="0" algn="ctr" defTabSz="914400" rtl="0" eaLnBrk="1" latinLnBrk="0" hangingPunct="1">
+              <a:spcBef>
+                <a:spcPct val="20000"/>
+              </a:spcBef>
+              <a:buFont typeface="Arial" panose="020B0604020202020204" pitchFamily="34" charset="0"/>
+              <a:buNone/>
+              <a:defRPr sz="2400" kern="1200">
+                <a:solidFill>
+                  <a:schemeClr val="tx1">
+                    <a:tint val="75000"/>
+                  </a:schemeClr>
+                </a:solidFill>
+                <a:latin typeface="+mn-lt"/>
+                <a:ea typeface="+mn-ea"/>
+                <a:cs typeface="+mn-cs"/>
+              </a:defRPr>
+            </a:lvl3pPr>
+            <a:lvl4pPr marL="1371600" indent="0" algn="ctr" defTabSz="914400" rtl="0" eaLnBrk="1" latinLnBrk="0" hangingPunct="1">
+              <a:spcBef>
+                <a:spcPct val="20000"/>
+              </a:spcBef>
+              <a:buFont typeface="Arial" panose="020B0604020202020204" pitchFamily="34" charset="0"/>
+              <a:buNone/>
+              <a:defRPr sz="2000" kern="1200">
+                <a:solidFill>
+                  <a:schemeClr val="tx1">
+                    <a:tint val="75000"/>
+                  </a:schemeClr>
+                </a:solidFill>
+                <a:latin typeface="+mn-lt"/>
+                <a:ea typeface="+mn-ea"/>
+                <a:cs typeface="+mn-cs"/>
+              </a:defRPr>
+            </a:lvl4pPr>
+            <a:lvl5pPr marL="1828800" indent="0" algn="ctr" defTabSz="914400" rtl="0" eaLnBrk="1" latinLnBrk="0" hangingPunct="1">
+              <a:spcBef>
+                <a:spcPct val="20000"/>
+              </a:spcBef>
+              <a:buFont typeface="Arial" panose="020B0604020202020204" pitchFamily="34" charset="0"/>
+              <a:buNone/>
+              <a:defRPr sz="2000" kern="1200">
+                <a:solidFill>
+                  <a:schemeClr val="tx1">
+                    <a:tint val="75000"/>
+                  </a:schemeClr>
+                </a:solidFill>
+                <a:latin typeface="+mn-lt"/>
+                <a:ea typeface="+mn-ea"/>
+                <a:cs typeface="+mn-cs"/>
+              </a:defRPr>
+            </a:lvl5pPr>
+            <a:lvl6pPr marL="2286000" indent="0" algn="ctr" defTabSz="914400" rtl="0" eaLnBrk="1" latinLnBrk="0" hangingPunct="1">
+              <a:spcBef>
+                <a:spcPct val="20000"/>
+              </a:spcBef>
+              <a:buFont typeface="Arial" panose="020B0604020202020204" pitchFamily="34" charset="0"/>
+              <a:buNone/>
+              <a:defRPr sz="2000" kern="1200">
+                <a:solidFill>
+                  <a:schemeClr val="tx1">
+                    <a:tint val="75000"/>
+                  </a:schemeClr>
+                </a:solidFill>
+                <a:latin typeface="+mn-lt"/>
+                <a:ea typeface="+mn-ea"/>
+                <a:cs typeface="+mn-cs"/>
+              </a:defRPr>
+            </a:lvl6pPr>
+            <a:lvl7pPr marL="2743200" indent="0" algn="ctr" defTabSz="914400" rtl="0" eaLnBrk="1" latinLnBrk="0" hangingPunct="1">
+              <a:spcBef>
+                <a:spcPct val="20000"/>
+              </a:spcBef>
+              <a:buFont typeface="Arial" panose="020B0604020202020204" pitchFamily="34" charset="0"/>
+              <a:buNone/>
+              <a:defRPr sz="2000" kern="1200">
+                <a:solidFill>
+                  <a:schemeClr val="tx1">
+                    <a:tint val="75000"/>
+                  </a:schemeClr>
+                </a:solidFill>
+                <a:latin typeface="+mn-lt"/>
+                <a:ea typeface="+mn-ea"/>
+                <a:cs typeface="+mn-cs"/>
+              </a:defRPr>
+            </a:lvl7pPr>
+            <a:lvl8pPr marL="3200400" indent="0" algn="ctr" defTabSz="914400" rtl="0" eaLnBrk="1" latinLnBrk="0" hangingPunct="1">
+              <a:spcBef>
+                <a:spcPct val="20000"/>
+              </a:spcBef>
+              <a:buFont typeface="Arial" panose="020B0604020202020204" pitchFamily="34" charset="0"/>
+              <a:buNone/>
+              <a:defRPr sz="2000" kern="1200">
+                <a:solidFill>
+                  <a:schemeClr val="tx1">
+                    <a:tint val="75000"/>
+                  </a:schemeClr>
+                </a:solidFill>
+                <a:latin typeface="+mn-lt"/>
+                <a:ea typeface="+mn-ea"/>
+                <a:cs typeface="+mn-cs"/>
+              </a:defRPr>
+            </a:lvl8pPr>
+            <a:lvl9pPr marL="3657600" indent="0" algn="ctr" defTabSz="914400" rtl="0" eaLnBrk="1" latinLnBrk="0" hangingPunct="1">
+              <a:spcBef>
+                <a:spcPct val="20000"/>
+              </a:spcBef>
+              <a:buFont typeface="Arial" panose="020B0604020202020204" pitchFamily="34" charset="0"/>
+              <a:buNone/>
+              <a:defRPr sz="2000" kern="1200">
+                <a:solidFill>
+                  <a:schemeClr val="tx1">
+                    <a:tint val="75000"/>
+                  </a:schemeClr>
+                </a:solidFill>
+                <a:latin typeface="+mn-lt"/>
+                <a:ea typeface="+mn-ea"/>
+                <a:cs typeface="+mn-cs"/>
+              </a:defRPr>
+            </a:lvl9pPr>
+          </a:lstStyle>
+          <a:p>
+            <a:r>
+              <a:rPr lang="en-US" sz="2400" dirty="0"/>
+              <a:t>17 September 2019</a:t>
+            </a:r>
+          </a:p>
+          <a:p>
+            <a:r>
+              <a:rPr lang="en-US" sz="2400" dirty="0"/>
+              <a:t>Bethesda, MD</a:t>
             </a:r>
           </a:p>
         </p:txBody>

</xml_diff>